<commit_message>
Added color/fonts to design
</commit_message>
<xml_diff>
--- a/Doc/Snåleboda design.pptx
+++ b/Doc/Snåleboda design.pptx
@@ -3090,7 +3090,12 @@
           <a:prstGeom prst="rect">
             <a:avLst/>
           </a:prstGeom>
-          <a:noFill/>
+          <a:solidFill>
+            <a:schemeClr val="accent4">
+              <a:lumMod val="40000"/>
+              <a:lumOff val="60000"/>
+            </a:schemeClr>
+          </a:solidFill>
         </p:spPr>
         <p:style>
           <a:lnRef idx="2">
@@ -3125,7 +3130,7 @@
         </p:nvSpPr>
         <p:spPr>
           <a:xfrm>
-            <a:off x="1084385" y="2151185"/>
+            <a:off x="1102254" y="1547570"/>
             <a:ext cx="2192215" cy="523220"/>
           </a:xfrm>
           <a:prstGeom prst="rect">
@@ -3134,20 +3139,29 @@
           <a:noFill/>
         </p:spPr>
         <p:txBody>
-          <a:bodyPr wrap="square" rtlCol="0">
+          <a:bodyPr wrap="square" rtlCol="0" anchor="t">
             <a:spAutoFit/>
           </a:bodyPr>
           <a:lstStyle/>
           <a:p>
             <a:r>
-              <a:rPr lang="sv-SE" sz="2800" dirty="0"/>
+              <a:rPr lang="sv-SE" sz="2800" dirty="0">
+                <a:latin typeface="Arial" panose="020B0604020202020204" pitchFamily="34" charset="0"/>
+                <a:cs typeface="Arial" panose="020B0604020202020204" pitchFamily="34" charset="0"/>
+              </a:rPr>
               <a:t>v</a:t>
             </a:r>
             <a:r>
-              <a:rPr lang="sv-SE" sz="2800" dirty="0" smtClean="0"/>
+              <a:rPr lang="sv-SE" sz="2800" dirty="0" smtClean="0">
+                <a:latin typeface="Arial" panose="020B0604020202020204" pitchFamily="34" charset="0"/>
+                <a:cs typeface="Arial" panose="020B0604020202020204" pitchFamily="34" charset="0"/>
+              </a:rPr>
               <a:t>älkommen</a:t>
             </a:r>
-            <a:endParaRPr lang="sv-SE" sz="2800" dirty="0"/>
+            <a:endParaRPr lang="sv-SE" sz="2800" dirty="0">
+              <a:latin typeface="Arial" panose="020B0604020202020204" pitchFamily="34" charset="0"/>
+              <a:cs typeface="Arial" panose="020B0604020202020204" pitchFamily="34" charset="0"/>
+            </a:endParaRPr>
           </a:p>
         </p:txBody>
       </p:sp>
@@ -3165,7 +3179,12 @@
           <a:prstGeom prst="rect">
             <a:avLst/>
           </a:prstGeom>
-          <a:noFill/>
+          <a:solidFill>
+            <a:schemeClr val="accent4">
+              <a:lumMod val="40000"/>
+              <a:lumOff val="60000"/>
+            </a:schemeClr>
+          </a:solidFill>
         </p:spPr>
         <p:style>
           <a:lnRef idx="2">
@@ -3200,13 +3219,18 @@
         </p:nvSpPr>
         <p:spPr>
           <a:xfrm>
-            <a:off x="6471140" y="2010508"/>
+            <a:off x="6471140" y="1990630"/>
             <a:ext cx="2584939" cy="3933092"/>
           </a:xfrm>
           <a:prstGeom prst="rect">
             <a:avLst/>
           </a:prstGeom>
-          <a:noFill/>
+          <a:solidFill>
+            <a:schemeClr val="accent4">
+              <a:lumMod val="40000"/>
+              <a:lumOff val="60000"/>
+            </a:schemeClr>
+          </a:solidFill>
         </p:spPr>
         <p:style>
           <a:lnRef idx="2">
@@ -3247,7 +3271,12 @@
           <a:prstGeom prst="rect">
             <a:avLst/>
           </a:prstGeom>
-          <a:noFill/>
+          <a:solidFill>
+            <a:schemeClr val="accent4">
+              <a:lumMod val="40000"/>
+              <a:lumOff val="60000"/>
+            </a:schemeClr>
+          </a:solidFill>
         </p:spPr>
         <p:style>
           <a:lnRef idx="2">
@@ -3282,7 +3311,7 @@
         </p:nvSpPr>
         <p:spPr>
           <a:xfrm>
-            <a:off x="3780693" y="2151185"/>
+            <a:off x="3786696" y="1531081"/>
             <a:ext cx="2192215" cy="523220"/>
           </a:xfrm>
           <a:prstGeom prst="rect">
@@ -3291,20 +3320,29 @@
           <a:noFill/>
         </p:spPr>
         <p:txBody>
-          <a:bodyPr wrap="square" rtlCol="0">
+          <a:bodyPr wrap="square" rtlCol="0" anchor="t">
             <a:spAutoFit/>
           </a:bodyPr>
           <a:lstStyle/>
           <a:p>
             <a:r>
-              <a:rPr lang="sv-SE" sz="2800" dirty="0"/>
+              <a:rPr lang="sv-SE" sz="2800" dirty="0">
+                <a:latin typeface="Arial" panose="020B0604020202020204" pitchFamily="34" charset="0"/>
+                <a:cs typeface="Arial" panose="020B0604020202020204" pitchFamily="34" charset="0"/>
+              </a:rPr>
               <a:t>n</a:t>
             </a:r>
             <a:r>
-              <a:rPr lang="sv-SE" sz="2800" dirty="0" smtClean="0"/>
+              <a:rPr lang="sv-SE" sz="2800" dirty="0" smtClean="0">
+                <a:latin typeface="Arial" panose="020B0604020202020204" pitchFamily="34" charset="0"/>
+                <a:cs typeface="Arial" panose="020B0604020202020204" pitchFamily="34" charset="0"/>
+              </a:rPr>
               <a:t>yheter</a:t>
             </a:r>
-            <a:endParaRPr lang="sv-SE" sz="2800" dirty="0"/>
+            <a:endParaRPr lang="sv-SE" sz="2800" dirty="0">
+              <a:latin typeface="Arial" panose="020B0604020202020204" pitchFamily="34" charset="0"/>
+              <a:cs typeface="Arial" panose="020B0604020202020204" pitchFamily="34" charset="0"/>
+            </a:endParaRPr>
           </a:p>
         </p:txBody>
       </p:sp>
@@ -3316,7 +3354,7 @@
         </p:nvSpPr>
         <p:spPr>
           <a:xfrm>
-            <a:off x="6471140" y="2151185"/>
+            <a:off x="6471138" y="1531081"/>
             <a:ext cx="2192215" cy="523220"/>
           </a:xfrm>
           <a:prstGeom prst="rect">
@@ -3325,17 +3363,23 @@
           <a:noFill/>
         </p:spPr>
         <p:txBody>
-          <a:bodyPr wrap="square" rtlCol="0">
+          <a:bodyPr wrap="square" rtlCol="0" anchor="t">
             <a:spAutoFit/>
           </a:bodyPr>
           <a:lstStyle/>
           <a:p>
             <a:r>
-              <a:rPr lang="sv-SE" sz="2800" dirty="0"/>
+              <a:rPr lang="sv-SE" sz="2800" dirty="0">
+                <a:latin typeface="Arial" panose="020B0604020202020204" pitchFamily="34" charset="0"/>
+                <a:cs typeface="Arial" panose="020B0604020202020204" pitchFamily="34" charset="0"/>
+              </a:rPr>
               <a:t>k</a:t>
             </a:r>
             <a:r>
-              <a:rPr lang="sv-SE" sz="2800" dirty="0" smtClean="0"/>
+              <a:rPr lang="sv-SE" sz="2800" dirty="0" smtClean="0">
+                <a:latin typeface="Arial" panose="020B0604020202020204" pitchFamily="34" charset="0"/>
+                <a:cs typeface="Arial" panose="020B0604020202020204" pitchFamily="34" charset="0"/>
+              </a:rPr>
               <a:t>ontakter</a:t>
             </a:r>
             <a:r>
@@ -3362,7 +3406,7 @@
         </p:nvSpPr>
         <p:spPr>
           <a:xfrm>
-            <a:off x="9161585" y="2151185"/>
+            <a:off x="9161585" y="1513529"/>
             <a:ext cx="2192215" cy="523220"/>
           </a:xfrm>
           <a:prstGeom prst="rect">
@@ -3371,20 +3415,29 @@
           <a:noFill/>
         </p:spPr>
         <p:txBody>
-          <a:bodyPr wrap="square" rtlCol="0">
+          <a:bodyPr wrap="square" rtlCol="0" anchor="t">
             <a:spAutoFit/>
           </a:bodyPr>
           <a:lstStyle/>
           <a:p>
             <a:r>
-              <a:rPr lang="sv-SE" sz="2800" dirty="0"/>
+              <a:rPr lang="sv-SE" sz="2800" dirty="0">
+                <a:latin typeface="Arial" panose="020B0604020202020204" pitchFamily="34" charset="0"/>
+                <a:cs typeface="Arial" panose="020B0604020202020204" pitchFamily="34" charset="0"/>
+              </a:rPr>
               <a:t>r</a:t>
             </a:r>
             <a:r>
-              <a:rPr lang="sv-SE" sz="2800" dirty="0" smtClean="0"/>
+              <a:rPr lang="sv-SE" sz="2800" dirty="0" smtClean="0">
+                <a:latin typeface="Arial" panose="020B0604020202020204" pitchFamily="34" charset="0"/>
+                <a:cs typeface="Arial" panose="020B0604020202020204" pitchFamily="34" charset="0"/>
+              </a:rPr>
               <a:t>apportera</a:t>
             </a:r>
-            <a:endParaRPr lang="sv-SE" sz="2800" dirty="0"/>
+            <a:endParaRPr lang="sv-SE" sz="2800" dirty="0">
+              <a:latin typeface="Arial" panose="020B0604020202020204" pitchFamily="34" charset="0"/>
+              <a:cs typeface="Arial" panose="020B0604020202020204" pitchFamily="34" charset="0"/>
+            </a:endParaRPr>
           </a:p>
         </p:txBody>
       </p:sp>
@@ -3396,7 +3449,7 @@
         </p:nvSpPr>
         <p:spPr>
           <a:xfrm>
-            <a:off x="3780693" y="2637803"/>
+            <a:off x="3780693" y="2014951"/>
             <a:ext cx="2274277" cy="276999"/>
           </a:xfrm>
           <a:prstGeom prst="rect">
@@ -3429,7 +3482,7 @@
         </p:nvSpPr>
         <p:spPr>
           <a:xfrm>
-            <a:off x="3780692" y="2901591"/>
+            <a:off x="3780692" y="2278739"/>
             <a:ext cx="2192215" cy="215444"/>
           </a:xfrm>
           <a:prstGeom prst="rect">
@@ -3466,7 +3519,7 @@
         </p:nvCxnSpPr>
         <p:spPr>
           <a:xfrm>
-            <a:off x="3821726" y="3100753"/>
+            <a:off x="3821726" y="2477901"/>
             <a:ext cx="2484000" cy="0"/>
           </a:xfrm>
           <a:prstGeom prst="line">
@@ -3501,7 +3554,7 @@
         </p:nvSpPr>
         <p:spPr>
           <a:xfrm>
-            <a:off x="3780692" y="3108051"/>
+            <a:off x="3780692" y="2485199"/>
             <a:ext cx="2274277" cy="276999"/>
           </a:xfrm>
           <a:prstGeom prst="rect">
@@ -3547,7 +3600,7 @@
         </p:nvSpPr>
         <p:spPr>
           <a:xfrm>
-            <a:off x="3780691" y="3371839"/>
+            <a:off x="3780691" y="2748987"/>
             <a:ext cx="2192215" cy="2308324"/>
           </a:xfrm>
           <a:prstGeom prst="rect">
@@ -4260,7 +4313,7 @@
         </p:nvCxnSpPr>
         <p:spPr>
           <a:xfrm>
-            <a:off x="3821726" y="5669419"/>
+            <a:off x="3821726" y="5046567"/>
             <a:ext cx="2484000" cy="0"/>
           </a:xfrm>
           <a:prstGeom prst="line">
@@ -4295,7 +4348,7 @@
         </p:nvSpPr>
         <p:spPr>
           <a:xfrm>
-            <a:off x="6471140" y="2576248"/>
+            <a:off x="6471140" y="1993155"/>
             <a:ext cx="1822939" cy="677108"/>
           </a:xfrm>
           <a:prstGeom prst="rect">
@@ -4337,7 +4390,7 @@
         </p:nvSpPr>
         <p:spPr>
           <a:xfrm>
-            <a:off x="6471139" y="3216396"/>
+            <a:off x="6471139" y="2633303"/>
             <a:ext cx="1822939" cy="677108"/>
           </a:xfrm>
           <a:prstGeom prst="rect">
@@ -4383,7 +4436,7 @@
         </p:nvSpPr>
         <p:spPr>
           <a:xfrm>
-            <a:off x="6471138" y="3831276"/>
+            <a:off x="6471138" y="3248183"/>
             <a:ext cx="1822939" cy="677108"/>
           </a:xfrm>
           <a:prstGeom prst="rect">
@@ -4425,7 +4478,7 @@
         </p:nvSpPr>
         <p:spPr>
           <a:xfrm>
-            <a:off x="9161585" y="2591636"/>
+            <a:off x="9161585" y="2015170"/>
             <a:ext cx="561372" cy="276999"/>
           </a:xfrm>
           <a:prstGeom prst="rect">
@@ -4455,7 +4508,7 @@
         </p:nvSpPr>
         <p:spPr>
           <a:xfrm>
-            <a:off x="9161585" y="3043504"/>
+            <a:off x="9161585" y="2467038"/>
             <a:ext cx="1559170" cy="276999"/>
           </a:xfrm>
           <a:prstGeom prst="rect">
@@ -4485,7 +4538,7 @@
         </p:nvSpPr>
         <p:spPr>
           <a:xfrm>
-            <a:off x="9255369" y="3313077"/>
+            <a:off x="9255369" y="2736611"/>
             <a:ext cx="2385646" cy="999451"/>
           </a:xfrm>
           <a:prstGeom prst="rect">
@@ -4553,7 +4606,7 @@
         </p:nvSpPr>
         <p:spPr>
           <a:xfrm>
-            <a:off x="9161585" y="4322003"/>
+            <a:off x="9161585" y="3745537"/>
             <a:ext cx="633046" cy="276999"/>
           </a:xfrm>
           <a:prstGeom prst="rect">
@@ -4577,53 +4630,13 @@
       </p:sp>
       <p:sp>
         <p:nvSpPr>
-          <p:cNvPr id="28" name="Rectangle 27"/>
-          <p:cNvSpPr/>
-          <p:nvPr/>
-        </p:nvSpPr>
-        <p:spPr>
-          <a:xfrm>
-            <a:off x="9671538" y="4504314"/>
-            <a:ext cx="1553308" cy="860753"/>
-          </a:xfrm>
-          <a:prstGeom prst="rect">
-            <a:avLst/>
-          </a:prstGeom>
-        </p:spPr>
-        <p:style>
-          <a:lnRef idx="2">
-            <a:schemeClr val="accent1">
-              <a:shade val="50000"/>
-            </a:schemeClr>
-          </a:lnRef>
-          <a:fillRef idx="1">
-            <a:schemeClr val="accent1"/>
-          </a:fillRef>
-          <a:effectRef idx="0">
-            <a:schemeClr val="accent1"/>
-          </a:effectRef>
-          <a:fontRef idx="minor">
-            <a:schemeClr val="lt1"/>
-          </a:fontRef>
-        </p:style>
-        <p:txBody>
-          <a:bodyPr rtlCol="0" anchor="ctr"/>
-          <a:lstStyle/>
-          <a:p>
-            <a:pPr algn="ctr"/>
-            <a:endParaRPr lang="sv-SE"/>
-          </a:p>
-        </p:txBody>
-      </p:sp>
-      <p:sp>
-        <p:nvSpPr>
           <p:cNvPr id="30" name="TextBox 29"/>
           <p:cNvSpPr txBox="1"/>
           <p:nvPr/>
         </p:nvSpPr>
         <p:spPr>
           <a:xfrm>
-            <a:off x="10070122" y="5484753"/>
+            <a:off x="10070122" y="5352231"/>
             <a:ext cx="756140" cy="369332"/>
           </a:xfrm>
           <a:prstGeom prst="rect">
@@ -4672,8 +4685,8 @@
         </p:blipFill>
         <p:spPr>
           <a:xfrm>
-            <a:off x="9671538" y="4504313"/>
-            <a:ext cx="1553308" cy="874611"/>
+            <a:off x="9671538" y="3927847"/>
+            <a:ext cx="1553308" cy="1258732"/>
           </a:xfrm>
           <a:prstGeom prst="rect">
             <a:avLst/>
@@ -4688,7 +4701,7 @@
         </p:nvSpPr>
         <p:spPr>
           <a:xfrm>
-            <a:off x="9255369" y="2823695"/>
+            <a:off x="9255369" y="2247229"/>
             <a:ext cx="2385646" cy="232118"/>
           </a:xfrm>
           <a:prstGeom prst="rect">
@@ -4747,7 +4760,7 @@
         </p:nvSpPr>
         <p:spPr>
           <a:xfrm>
-            <a:off x="1084385" y="3100753"/>
+            <a:off x="1084385" y="2736318"/>
             <a:ext cx="2590795" cy="584775"/>
           </a:xfrm>
           <a:prstGeom prst="rect">
@@ -4792,7 +4805,7 @@
         </p:blipFill>
         <p:spPr>
           <a:xfrm>
-            <a:off x="1437035" y="3698705"/>
+            <a:off x="1437035" y="3334270"/>
             <a:ext cx="1885493" cy="1267358"/>
           </a:xfrm>
           <a:prstGeom prst="rect">
@@ -4808,7 +4821,7 @@
         </p:nvSpPr>
         <p:spPr>
           <a:xfrm>
-            <a:off x="1811356" y="5016095"/>
+            <a:off x="1811356" y="4651660"/>
             <a:ext cx="1136850" cy="369332"/>
           </a:xfrm>
           <a:prstGeom prst="rect">
@@ -4836,14 +4849,14 @@
       </p:sp>
       <p:sp>
         <p:nvSpPr>
-          <p:cNvPr id="3" name="TextBox 2"/>
+          <p:cNvPr id="14" name="TextBox 13"/>
           <p:cNvSpPr txBox="1"/>
           <p:nvPr/>
         </p:nvSpPr>
         <p:spPr>
           <a:xfrm>
-            <a:off x="1084385" y="6096000"/>
-            <a:ext cx="10556630" cy="369332"/>
+            <a:off x="1084385" y="6109252"/>
+            <a:ext cx="10710050" cy="646331"/>
           </a:xfrm>
           <a:prstGeom prst="rect">
             <a:avLst/>
@@ -4858,15 +4871,31 @@
           <a:p>
             <a:r>
               <a:rPr lang="sv-SE" dirty="0" smtClean="0"/>
-              <a:t>Fonter och </a:t>
-            </a:r>
-            <a:r>
-              <a:rPr lang="sv-SE" smtClean="0"/>
-              <a:t>färger bestäms </a:t>
+              <a:t>Rubrikerna ovan bilderna är tänkt att vara med i appen. Antar att det blir flikar i </a:t>
+            </a:r>
+            <a:r>
+              <a:rPr lang="sv-SE" dirty="0" err="1" smtClean="0"/>
+              <a:t>Andriod</a:t>
             </a:r>
             <a:r>
               <a:rPr lang="sv-SE" dirty="0" smtClean="0"/>
-              <a:t>per plattform.</a:t>
+              <a:t> och </a:t>
+            </a:r>
+            <a:r>
+              <a:rPr lang="sv-SE" dirty="0" err="1" smtClean="0"/>
+              <a:t>iOS</a:t>
+            </a:r>
+            <a:r>
+              <a:rPr lang="sv-SE" dirty="0" smtClean="0"/>
+              <a:t> och i WP blir det </a:t>
+            </a:r>
+            <a:r>
+              <a:rPr lang="sv-SE" dirty="0" err="1" smtClean="0"/>
+              <a:t>hubrubriker</a:t>
+            </a:r>
+            <a:r>
+              <a:rPr lang="sv-SE" dirty="0" smtClean="0"/>
+              <a:t>.</a:t>
             </a:r>
             <a:endParaRPr lang="sv-SE" dirty="0"/>
           </a:p>

</xml_diff>

<commit_message>
updated ppt with API info
</commit_message>
<xml_diff>
--- a/Doc/Snåleboda design.pptx
+++ b/Doc/Snåleboda design.pptx
@@ -7,9 +7,10 @@
   <p:sldIdLst>
     <p:sldId id="256" r:id="rId2"/>
     <p:sldId id="257" r:id="rId3"/>
+    <p:sldId id="258" r:id="rId4"/>
   </p:sldIdLst>
   <p:sldSz cx="12192000" cy="6858000"/>
-  <p:notesSz cx="6858000" cy="9144000"/>
+  <p:notesSz cx="6797675" cy="9926638"/>
   <p:defaultTextStyle>
     <a:defPPr>
       <a:defRPr lang="sv-SE"/>
@@ -244,7 +245,7 @@
           <a:p>
             <a:fld id="{A4CC510D-50E1-4D33-87F6-45C27EDE9396}" type="datetimeFigureOut">
               <a:rPr lang="sv-SE" smtClean="0"/>
-              <a:t>2014-09-08</a:t>
+              <a:t>2014-09-12</a:t>
             </a:fld>
             <a:endParaRPr lang="sv-SE"/>
           </a:p>
@@ -414,7 +415,7 @@
           <a:p>
             <a:fld id="{A4CC510D-50E1-4D33-87F6-45C27EDE9396}" type="datetimeFigureOut">
               <a:rPr lang="sv-SE" smtClean="0"/>
-              <a:t>2014-09-08</a:t>
+              <a:t>2014-09-12</a:t>
             </a:fld>
             <a:endParaRPr lang="sv-SE"/>
           </a:p>
@@ -594,7 +595,7 @@
           <a:p>
             <a:fld id="{A4CC510D-50E1-4D33-87F6-45C27EDE9396}" type="datetimeFigureOut">
               <a:rPr lang="sv-SE" smtClean="0"/>
-              <a:t>2014-09-08</a:t>
+              <a:t>2014-09-12</a:t>
             </a:fld>
             <a:endParaRPr lang="sv-SE"/>
           </a:p>
@@ -764,7 +765,7 @@
           <a:p>
             <a:fld id="{A4CC510D-50E1-4D33-87F6-45C27EDE9396}" type="datetimeFigureOut">
               <a:rPr lang="sv-SE" smtClean="0"/>
-              <a:t>2014-09-08</a:t>
+              <a:t>2014-09-12</a:t>
             </a:fld>
             <a:endParaRPr lang="sv-SE"/>
           </a:p>
@@ -1010,7 +1011,7 @@
           <a:p>
             <a:fld id="{A4CC510D-50E1-4D33-87F6-45C27EDE9396}" type="datetimeFigureOut">
               <a:rPr lang="sv-SE" smtClean="0"/>
-              <a:t>2014-09-08</a:t>
+              <a:t>2014-09-12</a:t>
             </a:fld>
             <a:endParaRPr lang="sv-SE"/>
           </a:p>
@@ -1242,7 +1243,7 @@
           <a:p>
             <a:fld id="{A4CC510D-50E1-4D33-87F6-45C27EDE9396}" type="datetimeFigureOut">
               <a:rPr lang="sv-SE" smtClean="0"/>
-              <a:t>2014-09-08</a:t>
+              <a:t>2014-09-12</a:t>
             </a:fld>
             <a:endParaRPr lang="sv-SE"/>
           </a:p>
@@ -1609,7 +1610,7 @@
           <a:p>
             <a:fld id="{A4CC510D-50E1-4D33-87F6-45C27EDE9396}" type="datetimeFigureOut">
               <a:rPr lang="sv-SE" smtClean="0"/>
-              <a:t>2014-09-08</a:t>
+              <a:t>2014-09-12</a:t>
             </a:fld>
             <a:endParaRPr lang="sv-SE"/>
           </a:p>
@@ -1727,7 +1728,7 @@
           <a:p>
             <a:fld id="{A4CC510D-50E1-4D33-87F6-45C27EDE9396}" type="datetimeFigureOut">
               <a:rPr lang="sv-SE" smtClean="0"/>
-              <a:t>2014-09-08</a:t>
+              <a:t>2014-09-12</a:t>
             </a:fld>
             <a:endParaRPr lang="sv-SE"/>
           </a:p>
@@ -1822,7 +1823,7 @@
           <a:p>
             <a:fld id="{A4CC510D-50E1-4D33-87F6-45C27EDE9396}" type="datetimeFigureOut">
               <a:rPr lang="sv-SE" smtClean="0"/>
-              <a:t>2014-09-08</a:t>
+              <a:t>2014-09-12</a:t>
             </a:fld>
             <a:endParaRPr lang="sv-SE"/>
           </a:p>
@@ -2099,7 +2100,7 @@
           <a:p>
             <a:fld id="{A4CC510D-50E1-4D33-87F6-45C27EDE9396}" type="datetimeFigureOut">
               <a:rPr lang="sv-SE" smtClean="0"/>
-              <a:t>2014-09-08</a:t>
+              <a:t>2014-09-12</a:t>
             </a:fld>
             <a:endParaRPr lang="sv-SE"/>
           </a:p>
@@ -2352,7 +2353,7 @@
           <a:p>
             <a:fld id="{A4CC510D-50E1-4D33-87F6-45C27EDE9396}" type="datetimeFigureOut">
               <a:rPr lang="sv-SE" smtClean="0"/>
-              <a:t>2014-09-08</a:t>
+              <a:t>2014-09-12</a:t>
             </a:fld>
             <a:endParaRPr lang="sv-SE"/>
           </a:p>
@@ -2565,7 +2566,7 @@
           <a:p>
             <a:fld id="{A4CC510D-50E1-4D33-87F6-45C27EDE9396}" type="datetimeFigureOut">
               <a:rPr lang="sv-SE" smtClean="0"/>
-              <a:t>2014-09-08</a:t>
+              <a:t>2014-09-12</a:t>
             </a:fld>
             <a:endParaRPr lang="sv-SE"/>
           </a:p>
@@ -4921,6 +4922,237 @@
 </p:sld>
 </file>
 
+<file path=ppt/slides/slide3.xml><?xml version="1.0" encoding="utf-8"?>
+<p:sld xmlns:a="http://schemas.openxmlformats.org/drawingml/2006/main" xmlns:r="http://schemas.openxmlformats.org/officeDocument/2006/relationships" xmlns:p="http://schemas.openxmlformats.org/presentationml/2006/main">
+  <p:cSld>
+    <p:spTree>
+      <p:nvGrpSpPr>
+        <p:cNvPr id="1" name=""/>
+        <p:cNvGrpSpPr/>
+        <p:nvPr/>
+      </p:nvGrpSpPr>
+      <p:grpSpPr>
+        <a:xfrm>
+          <a:off x="0" y="0"/>
+          <a:ext cx="0" cy="0"/>
+          <a:chOff x="0" y="0"/>
+          <a:chExt cx="0" cy="0"/>
+        </a:xfrm>
+      </p:grpSpPr>
+      <p:sp>
+        <p:nvSpPr>
+          <p:cNvPr id="2" name="Title 1"/>
+          <p:cNvSpPr>
+            <a:spLocks noGrp="1"/>
+          </p:cNvSpPr>
+          <p:nvPr>
+            <p:ph type="title"/>
+          </p:nvPr>
+        </p:nvSpPr>
+        <p:spPr/>
+        <p:txBody>
+          <a:bodyPr/>
+          <a:lstStyle/>
+          <a:p>
+            <a:r>
+              <a:rPr lang="sv-SE" dirty="0" smtClean="0"/>
+              <a:t>API</a:t>
+            </a:r>
+            <a:endParaRPr lang="en-US" dirty="0"/>
+          </a:p>
+        </p:txBody>
+      </p:sp>
+      <p:sp>
+        <p:nvSpPr>
+          <p:cNvPr id="3" name="Content Placeholder 2"/>
+          <p:cNvSpPr>
+            <a:spLocks noGrp="1"/>
+          </p:cNvSpPr>
+          <p:nvPr>
+            <p:ph idx="1"/>
+          </p:nvPr>
+        </p:nvSpPr>
+        <p:spPr/>
+        <p:txBody>
+          <a:bodyPr>
+            <a:normAutofit fontScale="92500"/>
+          </a:bodyPr>
+          <a:lstStyle/>
+          <a:p>
+            <a:pPr marL="0" indent="0">
+              <a:buNone/>
+            </a:pPr>
+            <a:r>
+              <a:rPr lang="en-US" dirty="0"/>
+              <a:t> </a:t>
+            </a:r>
+            <a:r>
+              <a:rPr lang="en-US" dirty="0" err="1"/>
+              <a:t>const</a:t>
+            </a:r>
+            <a:r>
+              <a:rPr lang="en-US" dirty="0"/>
+              <a:t> string BASE_URL = "https://snaleboda.azure-mobile.net/tables/";</a:t>
+            </a:r>
+          </a:p>
+          <a:p>
+            <a:pPr marL="0" indent="0">
+              <a:buNone/>
+            </a:pPr>
+            <a:r>
+              <a:rPr lang="en-US" dirty="0"/>
+              <a:t>        </a:t>
+            </a:r>
+            <a:r>
+              <a:rPr lang="en-US" dirty="0" err="1"/>
+              <a:t>const</a:t>
+            </a:r>
+            <a:r>
+              <a:rPr lang="en-US" dirty="0"/>
+              <a:t> string NEWS_URL = BASE_URL + "news</a:t>
+            </a:r>
+            <a:r>
+              <a:rPr lang="en-US" dirty="0" smtClean="0"/>
+              <a:t>";</a:t>
+            </a:r>
+          </a:p>
+          <a:p>
+            <a:pPr marL="0" indent="0">
+              <a:buNone/>
+            </a:pPr>
+            <a:r>
+              <a:rPr lang="sv-SE" dirty="0"/>
+              <a:t>	</a:t>
+            </a:r>
+            <a:r>
+              <a:rPr lang="sv-SE" dirty="0" smtClean="0"/>
+              <a:t>http get</a:t>
+            </a:r>
+            <a:endParaRPr lang="en-US" dirty="0"/>
+          </a:p>
+          <a:p>
+            <a:pPr marL="0" indent="0">
+              <a:buNone/>
+            </a:pPr>
+            <a:r>
+              <a:rPr lang="en-US" dirty="0"/>
+              <a:t>        </a:t>
+            </a:r>
+            <a:r>
+              <a:rPr lang="en-US" dirty="0" err="1"/>
+              <a:t>const</a:t>
+            </a:r>
+            <a:r>
+              <a:rPr lang="en-US" dirty="0"/>
+              <a:t> string CONTACTS_URL = BASE_URL + "contacts</a:t>
+            </a:r>
+            <a:r>
+              <a:rPr lang="en-US" dirty="0" smtClean="0"/>
+              <a:t>";</a:t>
+            </a:r>
+          </a:p>
+          <a:p>
+            <a:pPr marL="0" indent="0">
+              <a:buNone/>
+            </a:pPr>
+            <a:r>
+              <a:rPr lang="sv-SE" dirty="0"/>
+              <a:t>	</a:t>
+            </a:r>
+            <a:r>
+              <a:rPr lang="sv-SE" dirty="0" smtClean="0"/>
+              <a:t>http get</a:t>
+            </a:r>
+            <a:endParaRPr lang="en-US" dirty="0"/>
+          </a:p>
+          <a:p>
+            <a:pPr marL="0" indent="0">
+              <a:buNone/>
+            </a:pPr>
+            <a:r>
+              <a:rPr lang="en-US" dirty="0"/>
+              <a:t>        </a:t>
+            </a:r>
+            <a:r>
+              <a:rPr lang="en-US" dirty="0" err="1"/>
+              <a:t>const</a:t>
+            </a:r>
+            <a:r>
+              <a:rPr lang="en-US" dirty="0"/>
+              <a:t> string INCIDENTS_URL = BASE_URL + "incidents</a:t>
+            </a:r>
+            <a:r>
+              <a:rPr lang="en-US" dirty="0" smtClean="0"/>
+              <a:t>";</a:t>
+            </a:r>
+          </a:p>
+          <a:p>
+            <a:pPr marL="0" indent="0">
+              <a:buNone/>
+            </a:pPr>
+            <a:r>
+              <a:rPr lang="sv-SE" dirty="0"/>
+              <a:t>	</a:t>
+            </a:r>
+            <a:r>
+              <a:rPr lang="sv-SE" dirty="0" smtClean="0"/>
+              <a:t>http </a:t>
+            </a:r>
+            <a:r>
+              <a:rPr lang="sv-SE" dirty="0" err="1" smtClean="0"/>
+              <a:t>put</a:t>
+            </a:r>
+            <a:endParaRPr lang="sv-SE" dirty="0" smtClean="0"/>
+          </a:p>
+          <a:p>
+            <a:pPr marL="1371600" lvl="3" indent="0">
+              <a:buNone/>
+            </a:pPr>
+            <a:r>
+              <a:rPr lang="en-US" dirty="0"/>
+              <a:t>name (string)</a:t>
+            </a:r>
+          </a:p>
+          <a:p>
+            <a:pPr marL="1371600" lvl="3" indent="0">
+              <a:buNone/>
+            </a:pPr>
+            <a:r>
+              <a:rPr lang="en-US" dirty="0"/>
+              <a:t>description (string)</a:t>
+            </a:r>
+          </a:p>
+          <a:p>
+            <a:pPr marL="1371600" lvl="3" indent="0">
+              <a:buNone/>
+            </a:pPr>
+            <a:r>
+              <a:rPr lang="en-US" dirty="0"/>
+              <a:t>image (string, base64)</a:t>
+            </a:r>
+          </a:p>
+        </p:txBody>
+      </p:sp>
+    </p:spTree>
+    <p:extLst>
+      <p:ext uri="{BB962C8B-B14F-4D97-AF65-F5344CB8AC3E}">
+        <p14:creationId xmlns:p14="http://schemas.microsoft.com/office/powerpoint/2010/main" val="377346357"/>
+      </p:ext>
+    </p:extLst>
+  </p:cSld>
+  <p:clrMapOvr>
+    <a:masterClrMapping/>
+  </p:clrMapOvr>
+  <p:timing>
+    <p:tnLst>
+      <p:par>
+        <p:cTn id="1" dur="indefinite" restart="never" nodeType="tmRoot"/>
+      </p:par>
+    </p:tnLst>
+  </p:timing>
+</p:sld>
+</file>
+
 <file path=ppt/theme/theme1.xml><?xml version="1.0" encoding="utf-8"?>
 <a:theme xmlns:a="http://schemas.openxmlformats.org/drawingml/2006/main" name="Office Theme">
   <a:themeElements>

</xml_diff>

<commit_message>
universal app - colors
</commit_message>
<xml_diff>
--- a/Doc/Snåleboda design.pptx
+++ b/Doc/Snåleboda design.pptx
@@ -245,7 +245,7 @@
           <a:p>
             <a:fld id="{A4CC510D-50E1-4D33-87F6-45C27EDE9396}" type="datetimeFigureOut">
               <a:rPr lang="sv-SE" smtClean="0"/>
-              <a:t>2014-09-12</a:t>
+              <a:t>2014-11-16</a:t>
             </a:fld>
             <a:endParaRPr lang="sv-SE"/>
           </a:p>
@@ -415,7 +415,7 @@
           <a:p>
             <a:fld id="{A4CC510D-50E1-4D33-87F6-45C27EDE9396}" type="datetimeFigureOut">
               <a:rPr lang="sv-SE" smtClean="0"/>
-              <a:t>2014-09-12</a:t>
+              <a:t>2014-11-16</a:t>
             </a:fld>
             <a:endParaRPr lang="sv-SE"/>
           </a:p>
@@ -595,7 +595,7 @@
           <a:p>
             <a:fld id="{A4CC510D-50E1-4D33-87F6-45C27EDE9396}" type="datetimeFigureOut">
               <a:rPr lang="sv-SE" smtClean="0"/>
-              <a:t>2014-09-12</a:t>
+              <a:t>2014-11-16</a:t>
             </a:fld>
             <a:endParaRPr lang="sv-SE"/>
           </a:p>
@@ -765,7 +765,7 @@
           <a:p>
             <a:fld id="{A4CC510D-50E1-4D33-87F6-45C27EDE9396}" type="datetimeFigureOut">
               <a:rPr lang="sv-SE" smtClean="0"/>
-              <a:t>2014-09-12</a:t>
+              <a:t>2014-11-16</a:t>
             </a:fld>
             <a:endParaRPr lang="sv-SE"/>
           </a:p>
@@ -1011,7 +1011,7 @@
           <a:p>
             <a:fld id="{A4CC510D-50E1-4D33-87F6-45C27EDE9396}" type="datetimeFigureOut">
               <a:rPr lang="sv-SE" smtClean="0"/>
-              <a:t>2014-09-12</a:t>
+              <a:t>2014-11-16</a:t>
             </a:fld>
             <a:endParaRPr lang="sv-SE"/>
           </a:p>
@@ -1243,7 +1243,7 @@
           <a:p>
             <a:fld id="{A4CC510D-50E1-4D33-87F6-45C27EDE9396}" type="datetimeFigureOut">
               <a:rPr lang="sv-SE" smtClean="0"/>
-              <a:t>2014-09-12</a:t>
+              <a:t>2014-11-16</a:t>
             </a:fld>
             <a:endParaRPr lang="sv-SE"/>
           </a:p>
@@ -1610,7 +1610,7 @@
           <a:p>
             <a:fld id="{A4CC510D-50E1-4D33-87F6-45C27EDE9396}" type="datetimeFigureOut">
               <a:rPr lang="sv-SE" smtClean="0"/>
-              <a:t>2014-09-12</a:t>
+              <a:t>2014-11-16</a:t>
             </a:fld>
             <a:endParaRPr lang="sv-SE"/>
           </a:p>
@@ -1728,7 +1728,7 @@
           <a:p>
             <a:fld id="{A4CC510D-50E1-4D33-87F6-45C27EDE9396}" type="datetimeFigureOut">
               <a:rPr lang="sv-SE" smtClean="0"/>
-              <a:t>2014-09-12</a:t>
+              <a:t>2014-11-16</a:t>
             </a:fld>
             <a:endParaRPr lang="sv-SE"/>
           </a:p>
@@ -1823,7 +1823,7 @@
           <a:p>
             <a:fld id="{A4CC510D-50E1-4D33-87F6-45C27EDE9396}" type="datetimeFigureOut">
               <a:rPr lang="sv-SE" smtClean="0"/>
-              <a:t>2014-09-12</a:t>
+              <a:t>2014-11-16</a:t>
             </a:fld>
             <a:endParaRPr lang="sv-SE"/>
           </a:p>
@@ -2100,7 +2100,7 @@
           <a:p>
             <a:fld id="{A4CC510D-50E1-4D33-87F6-45C27EDE9396}" type="datetimeFigureOut">
               <a:rPr lang="sv-SE" smtClean="0"/>
-              <a:t>2014-09-12</a:t>
+              <a:t>2014-11-16</a:t>
             </a:fld>
             <a:endParaRPr lang="sv-SE"/>
           </a:p>
@@ -2353,7 +2353,7 @@
           <a:p>
             <a:fld id="{A4CC510D-50E1-4D33-87F6-45C27EDE9396}" type="datetimeFigureOut">
               <a:rPr lang="sv-SE" smtClean="0"/>
-              <a:t>2014-09-12</a:t>
+              <a:t>2014-11-16</a:t>
             </a:fld>
             <a:endParaRPr lang="sv-SE"/>
           </a:p>
@@ -2566,7 +2566,7 @@
           <a:p>
             <a:fld id="{A4CC510D-50E1-4D33-87F6-45C27EDE9396}" type="datetimeFigureOut">
               <a:rPr lang="sv-SE" smtClean="0"/>
-              <a:t>2014-09-12</a:t>
+              <a:t>2014-11-16</a:t>
             </a:fld>
             <a:endParaRPr lang="sv-SE"/>
           </a:p>
@@ -3070,8 +3070,8 @@
           <a:lstStyle/>
           <a:p>
             <a:r>
-              <a:rPr lang="sv-SE" dirty="0" err="1" smtClean="0"/>
-              <a:t>Views</a:t>
+              <a:rPr lang="sv-SE" dirty="0" smtClean="0"/>
+              <a:t>Views </a:t>
             </a:r>
             <a:endParaRPr lang="sv-SE" dirty="0"/>
           </a:p>
@@ -3119,7 +3119,11 @@
           <a:lstStyle/>
           <a:p>
             <a:pPr algn="ctr"/>
-            <a:endParaRPr lang="sv-SE"/>
+            <a:endParaRPr lang="sv-SE">
+              <a:solidFill>
+                <a:srgbClr val="FFE699"/>
+              </a:solidFill>
+            </a:endParaRPr>
           </a:p>
         </p:txBody>
       </p:sp>

</xml_diff>